<commit_message>
se agrega el mensaje en el main
</commit_message>
<xml_diff>
--- a/GuiadeOrdenamientoInsertionSort.pptx
+++ b/GuiadeOrdenamientoInsertionSort.pptx
@@ -9,6 +9,10 @@
     <p:sldId id="257" r:id="rId3"/>
     <p:sldId id="258" r:id="rId4"/>
     <p:sldId id="259" r:id="rId5"/>
+    <p:sldId id="260" r:id="rId6"/>
+    <p:sldId id="261" r:id="rId7"/>
+    <p:sldId id="262" r:id="rId8"/>
+    <p:sldId id="263" r:id="rId9"/>
   </p:sldIdLst>
   <p:sldSz cx="12192000" cy="6858000"/>
   <p:notesSz cx="6858000" cy="9144000"/>
@@ -6677,6 +6681,242 @@
 </p:sld>
 </file>
 
+<file path=ppt/slides/slide5.xml><?xml version="1.0" encoding="utf-8"?>
+<p:sld xmlns:a="http://schemas.openxmlformats.org/drawingml/2006/main" xmlns:r="http://schemas.openxmlformats.org/officeDocument/2006/relationships" xmlns:p="http://schemas.openxmlformats.org/presentationml/2006/main">
+  <p:cSld>
+    <p:spTree>
+      <p:nvGrpSpPr>
+        <p:cNvPr id="1" name=""/>
+        <p:cNvGrpSpPr/>
+        <p:nvPr/>
+      </p:nvGrpSpPr>
+      <p:grpSpPr>
+        <a:xfrm>
+          <a:off x="0" y="0"/>
+          <a:ext cx="0" cy="0"/>
+          <a:chOff x="0" y="0"/>
+          <a:chExt cx="0" cy="0"/>
+        </a:xfrm>
+      </p:grpSpPr>
+      <p:pic>
+        <p:nvPicPr>
+          <p:cNvPr id="4" name="Marcador de contenido 3"/>
+          <p:cNvPicPr>
+            <a:picLocks noGrp="1"/>
+          </p:cNvPicPr>
+          <p:nvPr>
+            <p:ph idx="1"/>
+          </p:nvPr>
+        </p:nvPicPr>
+        <p:blipFill>
+          <a:blip r:embed="rId2" cstate="print">
+            <a:extLst>
+              <a:ext uri="{28A0092B-C50C-407E-A947-70E740481C1C}">
+                <a14:useLocalDpi xmlns:a14="http://schemas.microsoft.com/office/drawing/2010/main" val="0"/>
+              </a:ext>
+            </a:extLst>
+          </a:blip>
+          <a:stretch>
+            <a:fillRect/>
+          </a:stretch>
+        </p:blipFill>
+        <p:spPr>
+          <a:xfrm>
+            <a:off x="1194698" y="611451"/>
+            <a:ext cx="7671006" cy="5179749"/>
+          </a:xfrm>
+          <a:prstGeom prst="rect">
+            <a:avLst/>
+          </a:prstGeom>
+        </p:spPr>
+      </p:pic>
+    </p:spTree>
+    <p:extLst>
+      <p:ext uri="{BB962C8B-B14F-4D97-AF65-F5344CB8AC3E}">
+        <p14:creationId xmlns:p14="http://schemas.microsoft.com/office/powerpoint/2010/main" val="2299302067"/>
+      </p:ext>
+    </p:extLst>
+  </p:cSld>
+  <p:clrMapOvr>
+    <a:masterClrMapping/>
+  </p:clrMapOvr>
+</p:sld>
+</file>
+
+<file path=ppt/slides/slide6.xml><?xml version="1.0" encoding="utf-8"?>
+<p:sld xmlns:a="http://schemas.openxmlformats.org/drawingml/2006/main" xmlns:r="http://schemas.openxmlformats.org/officeDocument/2006/relationships" xmlns:p="http://schemas.openxmlformats.org/presentationml/2006/main">
+  <p:cSld>
+    <p:spTree>
+      <p:nvGrpSpPr>
+        <p:cNvPr id="1" name=""/>
+        <p:cNvGrpSpPr/>
+        <p:nvPr/>
+      </p:nvGrpSpPr>
+      <p:grpSpPr>
+        <a:xfrm>
+          <a:off x="0" y="0"/>
+          <a:ext cx="0" cy="0"/>
+          <a:chOff x="0" y="0"/>
+          <a:chExt cx="0" cy="0"/>
+        </a:xfrm>
+      </p:grpSpPr>
+      <p:pic>
+        <p:nvPicPr>
+          <p:cNvPr id="4" name="Marcador de contenido 3"/>
+          <p:cNvPicPr>
+            <a:picLocks noGrp="1"/>
+          </p:cNvPicPr>
+          <p:nvPr>
+            <p:ph idx="1"/>
+          </p:nvPr>
+        </p:nvPicPr>
+        <p:blipFill>
+          <a:blip r:embed="rId2" cstate="print">
+            <a:extLst>
+              <a:ext uri="{28A0092B-C50C-407E-A947-70E740481C1C}">
+                <a14:useLocalDpi xmlns:a14="http://schemas.microsoft.com/office/drawing/2010/main" val="0"/>
+              </a:ext>
+            </a:extLst>
+          </a:blip>
+          <a:stretch>
+            <a:fillRect/>
+          </a:stretch>
+        </p:blipFill>
+        <p:spPr>
+          <a:xfrm>
+            <a:off x="677863" y="935474"/>
+            <a:ext cx="8596312" cy="4833065"/>
+          </a:xfrm>
+          <a:prstGeom prst="rect">
+            <a:avLst/>
+          </a:prstGeom>
+        </p:spPr>
+      </p:pic>
+    </p:spTree>
+    <p:extLst>
+      <p:ext uri="{BB962C8B-B14F-4D97-AF65-F5344CB8AC3E}">
+        <p14:creationId xmlns:p14="http://schemas.microsoft.com/office/powerpoint/2010/main" val="4049434643"/>
+      </p:ext>
+    </p:extLst>
+  </p:cSld>
+  <p:clrMapOvr>
+    <a:masterClrMapping/>
+  </p:clrMapOvr>
+</p:sld>
+</file>
+
+<file path=ppt/slides/slide7.xml><?xml version="1.0" encoding="utf-8"?>
+<p:sld xmlns:a="http://schemas.openxmlformats.org/drawingml/2006/main" xmlns:r="http://schemas.openxmlformats.org/officeDocument/2006/relationships" xmlns:p="http://schemas.openxmlformats.org/presentationml/2006/main">
+  <p:cSld>
+    <p:spTree>
+      <p:nvGrpSpPr>
+        <p:cNvPr id="1" name=""/>
+        <p:cNvGrpSpPr/>
+        <p:nvPr/>
+      </p:nvGrpSpPr>
+      <p:grpSpPr>
+        <a:xfrm>
+          <a:off x="0" y="0"/>
+          <a:ext cx="0" cy="0"/>
+          <a:chOff x="0" y="0"/>
+          <a:chExt cx="0" cy="0"/>
+        </a:xfrm>
+      </p:grpSpPr>
+      <p:pic>
+        <p:nvPicPr>
+          <p:cNvPr id="4" name="Marcador de contenido 3"/>
+          <p:cNvPicPr>
+            <a:picLocks noGrp="1"/>
+          </p:cNvPicPr>
+          <p:nvPr>
+            <p:ph idx="1"/>
+          </p:nvPr>
+        </p:nvPicPr>
+        <p:blipFill>
+          <a:blip r:embed="rId2"/>
+          <a:stretch>
+            <a:fillRect/>
+          </a:stretch>
+        </p:blipFill>
+        <p:spPr>
+          <a:xfrm>
+            <a:off x="677863" y="836255"/>
+            <a:ext cx="8596312" cy="4833065"/>
+          </a:xfrm>
+          <a:prstGeom prst="rect">
+            <a:avLst/>
+          </a:prstGeom>
+        </p:spPr>
+      </p:pic>
+    </p:spTree>
+    <p:extLst>
+      <p:ext uri="{BB962C8B-B14F-4D97-AF65-F5344CB8AC3E}">
+        <p14:creationId xmlns:p14="http://schemas.microsoft.com/office/powerpoint/2010/main" val="3396509368"/>
+      </p:ext>
+    </p:extLst>
+  </p:cSld>
+  <p:clrMapOvr>
+    <a:masterClrMapping/>
+  </p:clrMapOvr>
+</p:sld>
+</file>
+
+<file path=ppt/slides/slide8.xml><?xml version="1.0" encoding="utf-8"?>
+<p:sld xmlns:a="http://schemas.openxmlformats.org/drawingml/2006/main" xmlns:r="http://schemas.openxmlformats.org/officeDocument/2006/relationships" xmlns:p="http://schemas.openxmlformats.org/presentationml/2006/main">
+  <p:cSld>
+    <p:spTree>
+      <p:nvGrpSpPr>
+        <p:cNvPr id="1" name=""/>
+        <p:cNvGrpSpPr/>
+        <p:nvPr/>
+      </p:nvGrpSpPr>
+      <p:grpSpPr>
+        <a:xfrm>
+          <a:off x="0" y="0"/>
+          <a:ext cx="0" cy="0"/>
+          <a:chOff x="0" y="0"/>
+          <a:chExt cx="0" cy="0"/>
+        </a:xfrm>
+      </p:grpSpPr>
+      <p:pic>
+        <p:nvPicPr>
+          <p:cNvPr id="4" name="Marcador de contenido 3"/>
+          <p:cNvPicPr>
+            <a:picLocks noGrp="1" noChangeAspect="1"/>
+          </p:cNvPicPr>
+          <p:nvPr>
+            <p:ph idx="1"/>
+          </p:nvPr>
+        </p:nvPicPr>
+        <p:blipFill>
+          <a:blip r:embed="rId2"/>
+          <a:stretch>
+            <a:fillRect/>
+          </a:stretch>
+        </p:blipFill>
+        <p:spPr>
+          <a:xfrm>
+            <a:off x="677863" y="770374"/>
+            <a:ext cx="8596312" cy="4833065"/>
+          </a:xfrm>
+          <a:prstGeom prst="rect">
+            <a:avLst/>
+          </a:prstGeom>
+        </p:spPr>
+      </p:pic>
+    </p:spTree>
+    <p:extLst>
+      <p:ext uri="{BB962C8B-B14F-4D97-AF65-F5344CB8AC3E}">
+        <p14:creationId xmlns:p14="http://schemas.microsoft.com/office/powerpoint/2010/main" val="1336649613"/>
+      </p:ext>
+    </p:extLst>
+  </p:cSld>
+  <p:clrMapOvr>
+    <a:masterClrMapping/>
+  </p:clrMapOvr>
+</p:sld>
+</file>
+
 <file path=ppt/theme/theme1.xml><?xml version="1.0" encoding="utf-8"?>
 <a:theme xmlns:a="http://schemas.openxmlformats.org/drawingml/2006/main" name="Faceta">
   <a:themeElements>

</xml_diff>